<commit_message>
Änderung Präsentation User Story
</commit_message>
<xml_diff>
--- a/Präsentation/Präsentation Gruppe 2.pptx
+++ b/Präsentation/Präsentation Gruppe 2.pptx
@@ -13,8 +13,8 @@
     <p:sldId id="259" r:id="rId4"/>
     <p:sldId id="262" r:id="rId5"/>
     <p:sldId id="260" r:id="rId6"/>
-    <p:sldId id="261" r:id="rId7"/>
-    <p:sldId id="263" r:id="rId8"/>
+    <p:sldId id="263" r:id="rId7"/>
+    <p:sldId id="269" r:id="rId8"/>
     <p:sldId id="264" r:id="rId9"/>
     <p:sldId id="265" r:id="rId10"/>
     <p:sldId id="266" r:id="rId11"/>
@@ -518,7 +518,7 @@
           <a:lstStyle/>
           <a:p>
             <a:r>
-              <a:rPr lang="de-DE" sz="1200" b="1" kern="1200" dirty="0">
+              <a:rPr lang="de-DE" sz="1200" b="1" kern="1200" dirty="0" smtClean="0">
                 <a:solidFill>
                   <a:schemeClr val="tx1"/>
                 </a:solidFill>
@@ -530,7 +530,7 @@
               <a:t>User Story Andreas Müller</a:t>
             </a:r>
             <a:br>
-              <a:rPr lang="de-DE" sz="1200" b="1" kern="1200" dirty="0">
+              <a:rPr lang="de-DE" sz="1200" b="1" kern="1200" dirty="0" smtClean="0">
                 <a:solidFill>
                   <a:schemeClr val="tx1"/>
                 </a:solidFill>
@@ -540,7 +540,7 @@
                 <a:cs typeface="+mn-cs"/>
               </a:rPr>
             </a:br>
-            <a:endParaRPr lang="de-DE" sz="1200" b="1" kern="1200" dirty="0">
+            <a:endParaRPr lang="de-DE" sz="1200" b="1" kern="1200" dirty="0" smtClean="0">
               <a:solidFill>
                 <a:schemeClr val="tx1"/>
               </a:solidFill>
@@ -552,7 +552,7 @@
           </a:p>
           <a:p>
             <a:r>
-              <a:rPr lang="de-DE" sz="1200" kern="1200" dirty="0">
+              <a:rPr lang="de-DE" sz="1200" kern="1200" dirty="0" smtClean="0">
                 <a:solidFill>
                   <a:schemeClr val="tx1"/>
                 </a:solidFill>
@@ -567,7 +567,7 @@
           <a:p>
             <a:pPr lvl="0"/>
             <a:r>
-              <a:rPr lang="de-DE" sz="1200" kern="1200" dirty="0">
+              <a:rPr lang="de-DE" sz="1200" kern="1200" dirty="0" smtClean="0">
                 <a:solidFill>
                   <a:schemeClr val="tx1"/>
                 </a:solidFill>
@@ -580,6 +580,9 @@
             </a:r>
           </a:p>
           <a:p>
+            <a:endParaRPr lang="de-DE" dirty="0" smtClean="0"/>
+          </a:p>
+          <a:p>
             <a:endParaRPr lang="de-DE" dirty="0"/>
           </a:p>
         </p:txBody>
@@ -601,7 +604,7 @@
           <a:p>
             <a:fld id="{027154C5-65B5-48B3-B278-9C20A192C269}" type="slidenum">
               <a:rPr lang="de-DE" smtClean="0"/>
-              <a:t>6</a:t>
+              <a:t>5</a:t>
             </a:fld>
             <a:endParaRPr lang="de-DE"/>
           </a:p>
@@ -610,7 +613,7 @@
     </p:spTree>
     <p:extLst>
       <p:ext uri="{BB962C8B-B14F-4D97-AF65-F5344CB8AC3E}">
-        <p14:creationId xmlns:p14="http://schemas.microsoft.com/office/powerpoint/2010/main" val="1185367282"/>
+        <p14:creationId xmlns:p14="http://schemas.microsoft.com/office/powerpoint/2010/main" val="121143309"/>
       </p:ext>
     </p:extLst>
   </p:cSld>
@@ -3695,6 +3698,13 @@
   <p:clrMapOvr>
     <a:masterClrMapping/>
   </p:clrMapOvr>
+  <p:timing>
+    <p:tnLst>
+      <p:par>
+        <p:cTn id="1" dur="indefinite" restart="never" nodeType="tmRoot"/>
+      </p:par>
+    </p:tnLst>
+  </p:timing>
 </p:sld>
 </file>
 
@@ -3948,12 +3958,16 @@
               <a:t>Grundidee war ein einfacher </a:t>
             </a:r>
             <a:r>
-              <a:rPr lang="de-DE" sz="2400" dirty="0" err="1"/>
+              <a:rPr lang="de-DE" sz="2400" dirty="0" err="1" smtClean="0"/>
               <a:t>Pricetracker</a:t>
             </a:r>
             <a:r>
+              <a:rPr lang="de-DE" sz="2400" dirty="0" smtClean="0"/>
+              <a:t> </a:t>
+            </a:r>
+            <a:r>
               <a:rPr lang="de-DE" sz="2400" dirty="0"/>
-              <a:t> für Webshops</a:t>
+              <a:t>für Webshops</a:t>
             </a:r>
           </a:p>
           <a:p>
@@ -4171,7 +4185,7 @@
           <p:nvPr/>
         </p:nvPicPr>
         <p:blipFill>
-          <a:blip r:embed="rId3">
+          <a:blip r:embed="rId2">
             <a:extLst>
               <a:ext uri="{28A0092B-C50C-407E-A947-70E740481C1C}">
                 <a14:useLocalDpi xmlns:a14="http://schemas.microsoft.com/office/drawing/2010/main" val="0"/>
@@ -4230,7 +4244,7 @@
           <p:nvPr/>
         </p:nvPicPr>
         <p:blipFill>
-          <a:blip r:embed="rId4">
+          <a:blip r:embed="rId3">
             <a:extLst>
               <a:ext uri="{28A0092B-C50C-407E-A947-70E740481C1C}">
                 <a14:useLocalDpi xmlns:a14="http://schemas.microsoft.com/office/drawing/2010/main" val="0"/>
@@ -4261,6 +4275,13 @@
   <p:clrMapOvr>
     <a:masterClrMapping/>
   </p:clrMapOvr>
+  <p:timing>
+    <p:tnLst>
+      <p:par>
+        <p:cTn id="1" dur="indefinite" restart="never" nodeType="tmRoot"/>
+      </p:par>
+    </p:tnLst>
+  </p:timing>
 </p:sld>
 </file>
 
@@ -4368,9 +4389,10 @@
           <a:lstStyle/>
           <a:p>
             <a:r>
-              <a:rPr lang="de-DE" sz="4000" dirty="0"/>
-              <a:t>Persona</a:t>
-            </a:r>
+              <a:rPr lang="de-DE" sz="4000" dirty="0" smtClean="0"/>
+              <a:t>Persona und User Story</a:t>
+            </a:r>
+            <a:endParaRPr lang="de-DE" sz="4000" dirty="0"/>
           </a:p>
         </p:txBody>
       </p:sp>
@@ -4383,7 +4405,7 @@
           <p:nvPr/>
         </p:nvPicPr>
         <p:blipFill>
-          <a:blip r:embed="rId2">
+          <a:blip r:embed="rId3">
             <a:extLst>
               <a:ext uri="{28A0092B-C50C-407E-A947-70E740481C1C}">
                 <a14:useLocalDpi xmlns:a14="http://schemas.microsoft.com/office/drawing/2010/main" val="0"/>
@@ -4397,19 +4419,42 @@
         </p:blipFill>
         <p:spPr bwMode="auto">
           <a:xfrm>
-            <a:off x="5680465" y="3930842"/>
+            <a:off x="1119679" y="1587878"/>
             <a:ext cx="2027842" cy="2027842"/>
           </a:xfrm>
           <a:prstGeom prst="rect">
             <a:avLst/>
           </a:prstGeom>
-          <a:noFill/>
-          <a:ln>
-            <a:noFill/>
+          <a:solidFill>
+            <a:srgbClr val="FFFFFF">
+              <a:shade val="85000"/>
+            </a:srgbClr>
+          </a:solidFill>
+          <a:ln w="88900" cap="sq">
+            <a:solidFill>
+              <a:srgbClr val="FFFFFF"/>
+            </a:solidFill>
+            <a:miter lim="800000"/>
           </a:ln>
           <a:effectLst>
-            <a:softEdge rad="114300"/>
+            <a:outerShdw blurRad="55000" dist="18000" dir="5400000" algn="tl" rotWithShape="0">
+              <a:srgbClr val="000000">
+                <a:alpha val="40000"/>
+              </a:srgbClr>
+            </a:outerShdw>
           </a:effectLst>
+          <a:scene3d>
+            <a:camera prst="orthographicFront"/>
+            <a:lightRig rig="twoPt" dir="t">
+              <a:rot lat="0" lon="0" rev="7200000"/>
+            </a:lightRig>
+          </a:scene3d>
+          <a:sp3d>
+            <a:bevelT w="25400" h="19050"/>
+            <a:contourClr>
+              <a:srgbClr val="FFFFFF"/>
+            </a:contourClr>
+          </a:sp3d>
           <a:extLst>
             <a:ext uri="{909E8E84-426E-40DD-AFC4-6F175D3DCCD1}">
               <a14:hiddenFill xmlns:a14="http://schemas.microsoft.com/office/drawing/2010/main">
@@ -4431,6 +4476,421 @@
           </a:extLst>
         </p:spPr>
       </p:pic>
+      <p:sp>
+        <p:nvSpPr>
+          <p:cNvPr id="9" name="Inhaltsplatzhalter 5"/>
+          <p:cNvSpPr txBox="1">
+            <a:spLocks/>
+          </p:cNvSpPr>
+          <p:nvPr/>
+        </p:nvSpPr>
+        <p:spPr>
+          <a:xfrm>
+            <a:off x="3294956" y="1671667"/>
+            <a:ext cx="5334036" cy="2011553"/>
+          </a:xfrm>
+          <a:prstGeom prst="rect">
+            <a:avLst/>
+          </a:prstGeom>
+        </p:spPr>
+        <p:txBody>
+          <a:bodyPr vert="horz" lIns="91440" tIns="45720" rIns="91440" bIns="45720" rtlCol="0">
+            <a:normAutofit lnSpcReduction="10000"/>
+          </a:bodyPr>
+          <a:lstStyle>
+            <a:lvl1pPr marL="228600" indent="-228600" algn="l" defTabSz="914400" rtl="0" eaLnBrk="1" latinLnBrk="0" hangingPunct="1">
+              <a:lnSpc>
+                <a:spcPct val="90000"/>
+              </a:lnSpc>
+              <a:spcBef>
+                <a:spcPts val="1000"/>
+              </a:spcBef>
+              <a:buFont typeface="Arial" panose="020B0604020202020204" pitchFamily="34" charset="0"/>
+              <a:buChar char="•"/>
+              <a:defRPr sz="2800" kern="1200">
+                <a:solidFill>
+                  <a:schemeClr val="tx1"/>
+                </a:solidFill>
+                <a:latin typeface="+mn-lt"/>
+                <a:ea typeface="+mn-ea"/>
+                <a:cs typeface="+mn-cs"/>
+              </a:defRPr>
+            </a:lvl1pPr>
+            <a:lvl2pPr marL="685800" indent="-228600" algn="l" defTabSz="914400" rtl="0" eaLnBrk="1" latinLnBrk="0" hangingPunct="1">
+              <a:lnSpc>
+                <a:spcPct val="90000"/>
+              </a:lnSpc>
+              <a:spcBef>
+                <a:spcPts val="500"/>
+              </a:spcBef>
+              <a:buFont typeface="Arial" panose="020B0604020202020204" pitchFamily="34" charset="0"/>
+              <a:buChar char="•"/>
+              <a:defRPr sz="2400" kern="1200">
+                <a:solidFill>
+                  <a:schemeClr val="tx1"/>
+                </a:solidFill>
+                <a:latin typeface="+mn-lt"/>
+                <a:ea typeface="+mn-ea"/>
+                <a:cs typeface="+mn-cs"/>
+              </a:defRPr>
+            </a:lvl2pPr>
+            <a:lvl3pPr marL="1143000" indent="-228600" algn="l" defTabSz="914400" rtl="0" eaLnBrk="1" latinLnBrk="0" hangingPunct="1">
+              <a:lnSpc>
+                <a:spcPct val="90000"/>
+              </a:lnSpc>
+              <a:spcBef>
+                <a:spcPts val="500"/>
+              </a:spcBef>
+              <a:buFont typeface="Arial" panose="020B0604020202020204" pitchFamily="34" charset="0"/>
+              <a:buChar char="•"/>
+              <a:defRPr sz="2000" kern="1200">
+                <a:solidFill>
+                  <a:schemeClr val="tx1"/>
+                </a:solidFill>
+                <a:latin typeface="+mn-lt"/>
+                <a:ea typeface="+mn-ea"/>
+                <a:cs typeface="+mn-cs"/>
+              </a:defRPr>
+            </a:lvl3pPr>
+            <a:lvl4pPr marL="1600200" indent="-228600" algn="l" defTabSz="914400" rtl="0" eaLnBrk="1" latinLnBrk="0" hangingPunct="1">
+              <a:lnSpc>
+                <a:spcPct val="90000"/>
+              </a:lnSpc>
+              <a:spcBef>
+                <a:spcPts val="500"/>
+              </a:spcBef>
+              <a:buFont typeface="Arial" panose="020B0604020202020204" pitchFamily="34" charset="0"/>
+              <a:buChar char="•"/>
+              <a:defRPr sz="1800" kern="1200">
+                <a:solidFill>
+                  <a:schemeClr val="tx1"/>
+                </a:solidFill>
+                <a:latin typeface="+mn-lt"/>
+                <a:ea typeface="+mn-ea"/>
+                <a:cs typeface="+mn-cs"/>
+              </a:defRPr>
+            </a:lvl4pPr>
+            <a:lvl5pPr marL="2057400" indent="-228600" algn="l" defTabSz="914400" rtl="0" eaLnBrk="1" latinLnBrk="0" hangingPunct="1">
+              <a:lnSpc>
+                <a:spcPct val="90000"/>
+              </a:lnSpc>
+              <a:spcBef>
+                <a:spcPts val="500"/>
+              </a:spcBef>
+              <a:buFont typeface="Arial" panose="020B0604020202020204" pitchFamily="34" charset="0"/>
+              <a:buChar char="•"/>
+              <a:defRPr sz="1800" kern="1200">
+                <a:solidFill>
+                  <a:schemeClr val="tx1"/>
+                </a:solidFill>
+                <a:latin typeface="+mn-lt"/>
+                <a:ea typeface="+mn-ea"/>
+                <a:cs typeface="+mn-cs"/>
+              </a:defRPr>
+            </a:lvl5pPr>
+            <a:lvl6pPr marL="2514600" indent="-228600" algn="l" defTabSz="914400" rtl="0" eaLnBrk="1" latinLnBrk="0" hangingPunct="1">
+              <a:lnSpc>
+                <a:spcPct val="90000"/>
+              </a:lnSpc>
+              <a:spcBef>
+                <a:spcPts val="500"/>
+              </a:spcBef>
+              <a:buFont typeface="Arial" panose="020B0604020202020204" pitchFamily="34" charset="0"/>
+              <a:buChar char="•"/>
+              <a:defRPr sz="1800" kern="1200">
+                <a:solidFill>
+                  <a:schemeClr val="tx1"/>
+                </a:solidFill>
+                <a:latin typeface="+mn-lt"/>
+                <a:ea typeface="+mn-ea"/>
+                <a:cs typeface="+mn-cs"/>
+              </a:defRPr>
+            </a:lvl6pPr>
+            <a:lvl7pPr marL="2971800" indent="-228600" algn="l" defTabSz="914400" rtl="0" eaLnBrk="1" latinLnBrk="0" hangingPunct="1">
+              <a:lnSpc>
+                <a:spcPct val="90000"/>
+              </a:lnSpc>
+              <a:spcBef>
+                <a:spcPts val="500"/>
+              </a:spcBef>
+              <a:buFont typeface="Arial" panose="020B0604020202020204" pitchFamily="34" charset="0"/>
+              <a:buChar char="•"/>
+              <a:defRPr sz="1800" kern="1200">
+                <a:solidFill>
+                  <a:schemeClr val="tx1"/>
+                </a:solidFill>
+                <a:latin typeface="+mn-lt"/>
+                <a:ea typeface="+mn-ea"/>
+                <a:cs typeface="+mn-cs"/>
+              </a:defRPr>
+            </a:lvl7pPr>
+            <a:lvl8pPr marL="3429000" indent="-228600" algn="l" defTabSz="914400" rtl="0" eaLnBrk="1" latinLnBrk="0" hangingPunct="1">
+              <a:lnSpc>
+                <a:spcPct val="90000"/>
+              </a:lnSpc>
+              <a:spcBef>
+                <a:spcPts val="500"/>
+              </a:spcBef>
+              <a:buFont typeface="Arial" panose="020B0604020202020204" pitchFamily="34" charset="0"/>
+              <a:buChar char="•"/>
+              <a:defRPr sz="1800" kern="1200">
+                <a:solidFill>
+                  <a:schemeClr val="tx1"/>
+                </a:solidFill>
+                <a:latin typeface="+mn-lt"/>
+                <a:ea typeface="+mn-ea"/>
+                <a:cs typeface="+mn-cs"/>
+              </a:defRPr>
+            </a:lvl8pPr>
+            <a:lvl9pPr marL="3886200" indent="-228600" algn="l" defTabSz="914400" rtl="0" eaLnBrk="1" latinLnBrk="0" hangingPunct="1">
+              <a:lnSpc>
+                <a:spcPct val="90000"/>
+              </a:lnSpc>
+              <a:spcBef>
+                <a:spcPts val="500"/>
+              </a:spcBef>
+              <a:buFont typeface="Arial" panose="020B0604020202020204" pitchFamily="34" charset="0"/>
+              <a:buChar char="•"/>
+              <a:defRPr sz="1800" kern="1200">
+                <a:solidFill>
+                  <a:schemeClr val="tx1"/>
+                </a:solidFill>
+                <a:latin typeface="+mn-lt"/>
+                <a:ea typeface="+mn-ea"/>
+                <a:cs typeface="+mn-cs"/>
+              </a:defRPr>
+            </a:lvl9pPr>
+          </a:lstStyle>
+          <a:p>
+            <a:pPr marL="0" indent="0">
+              <a:buNone/>
+            </a:pPr>
+            <a:r>
+              <a:rPr lang="de-DE" sz="2000" dirty="0"/>
+              <a:t>Andreas Müller der preisbewusste Familienvater</a:t>
+            </a:r>
+          </a:p>
+          <a:p>
+            <a:pPr lvl="1"/>
+            <a:r>
+              <a:rPr lang="de-DE" sz="2000" dirty="0"/>
+              <a:t>Technisch kaum versiert</a:t>
+            </a:r>
+          </a:p>
+          <a:p>
+            <a:pPr lvl="1"/>
+            <a:r>
+              <a:rPr lang="de-DE" sz="2000" dirty="0"/>
+              <a:t>Wenig Onlineerfahrung</a:t>
+            </a:r>
+          </a:p>
+          <a:p>
+            <a:pPr lvl="1"/>
+            <a:r>
+              <a:rPr lang="de-DE" sz="2000" dirty="0"/>
+              <a:t>Beschäftigt sich kaum mit Shops</a:t>
+            </a:r>
+          </a:p>
+          <a:p>
+            <a:pPr lvl="1"/>
+            <a:r>
+              <a:rPr lang="de-DE" sz="2000" dirty="0"/>
+              <a:t>Auf neue Funktionen legt er keinen Wert </a:t>
+            </a:r>
+          </a:p>
+          <a:p>
+            <a:pPr lvl="1"/>
+            <a:r>
+              <a:rPr lang="de-DE" sz="2000" dirty="0"/>
+              <a:t>Typischer „DAU</a:t>
+            </a:r>
+            <a:r>
+              <a:rPr lang="de-DE" sz="2000" dirty="0" smtClean="0"/>
+              <a:t>“</a:t>
+            </a:r>
+            <a:endParaRPr lang="de-DE" dirty="0"/>
+          </a:p>
+          <a:p>
+            <a:pPr marL="571500" indent="-571500">
+              <a:buFont typeface="+mj-lt"/>
+              <a:buAutoNum type="romanUcPeriod"/>
+            </a:pPr>
+            <a:endParaRPr lang="de-DE" dirty="0"/>
+          </a:p>
+          <a:p>
+            <a:pPr marL="514350" indent="-514350">
+              <a:buFont typeface="+mj-lt"/>
+              <a:buAutoNum type="romanUcPeriod"/>
+            </a:pPr>
+            <a:endParaRPr lang="de-DE" dirty="0"/>
+          </a:p>
+        </p:txBody>
+      </p:sp>
+      <p:pic>
+        <p:nvPicPr>
+          <p:cNvPr id="10" name="Grafik 9"/>
+          <p:cNvPicPr>
+            <a:picLocks noChangeAspect="1"/>
+          </p:cNvPicPr>
+          <p:nvPr/>
+        </p:nvPicPr>
+        <p:blipFill>
+          <a:blip r:embed="rId4">
+            <a:extLst>
+              <a:ext uri="{28A0092B-C50C-407E-A947-70E740481C1C}">
+                <a14:useLocalDpi xmlns:a14="http://schemas.microsoft.com/office/drawing/2010/main" val="0"/>
+              </a:ext>
+            </a:extLst>
+          </a:blip>
+          <a:stretch>
+            <a:fillRect/>
+          </a:stretch>
+        </p:blipFill>
+        <p:spPr>
+          <a:xfrm>
+            <a:off x="1068540" y="3487785"/>
+            <a:ext cx="3221414" cy="2608006"/>
+          </a:xfrm>
+          <a:prstGeom prst="rect">
+            <a:avLst/>
+          </a:prstGeom>
+        </p:spPr>
+      </p:pic>
+    </p:spTree>
+    <p:extLst>
+      <p:ext uri="{BB962C8B-B14F-4D97-AF65-F5344CB8AC3E}">
+        <p14:creationId xmlns:p14="http://schemas.microsoft.com/office/powerpoint/2010/main" val="295717713"/>
+      </p:ext>
+    </p:extLst>
+  </p:cSld>
+  <p:clrMapOvr>
+    <a:masterClrMapping/>
+  </p:clrMapOvr>
+  <p:timing>
+    <p:tnLst>
+      <p:par>
+        <p:cTn id="1" dur="indefinite" restart="never" nodeType="tmRoot"/>
+      </p:par>
+    </p:tnLst>
+  </p:timing>
+</p:sld>
+</file>
+
+<file path=ppt/slides/slide6.xml><?xml version="1.0" encoding="utf-8"?>
+<p:sld xmlns:a="http://schemas.openxmlformats.org/drawingml/2006/main" xmlns:r="http://schemas.openxmlformats.org/officeDocument/2006/relationships" xmlns:p="http://schemas.openxmlformats.org/presentationml/2006/main">
+  <p:cSld>
+    <p:spTree>
+      <p:nvGrpSpPr>
+        <p:cNvPr id="1" name=""/>
+        <p:cNvGrpSpPr/>
+        <p:nvPr/>
+      </p:nvGrpSpPr>
+      <p:grpSpPr>
+        <a:xfrm>
+          <a:off x="0" y="0"/>
+          <a:ext cx="0" cy="0"/>
+          <a:chOff x="0" y="0"/>
+          <a:chExt cx="0" cy="0"/>
+        </a:xfrm>
+      </p:grpSpPr>
+      <p:sp>
+        <p:nvSpPr>
+          <p:cNvPr id="6" name="Inhaltsplatzhalter 5"/>
+          <p:cNvSpPr>
+            <a:spLocks noGrp="1"/>
+          </p:cNvSpPr>
+          <p:nvPr>
+            <p:ph idx="1"/>
+          </p:nvPr>
+        </p:nvSpPr>
+        <p:spPr>
+          <a:xfrm>
+            <a:off x="1091663" y="3561357"/>
+            <a:ext cx="8105151" cy="3617607"/>
+          </a:xfrm>
+        </p:spPr>
+        <p:txBody>
+          <a:bodyPr/>
+          <a:lstStyle/>
+          <a:p>
+            <a:endParaRPr lang="de-DE" sz="2400" dirty="0"/>
+          </a:p>
+          <a:p>
+            <a:endParaRPr lang="de-DE" dirty="0"/>
+          </a:p>
+          <a:p>
+            <a:pPr marL="571500" indent="-571500">
+              <a:buFont typeface="+mj-lt"/>
+              <a:buAutoNum type="romanUcPeriod"/>
+            </a:pPr>
+            <a:endParaRPr lang="de-DE" dirty="0"/>
+          </a:p>
+          <a:p>
+            <a:pPr marL="514350" indent="-514350">
+              <a:buFont typeface="+mj-lt"/>
+              <a:buAutoNum type="romanUcPeriod"/>
+            </a:pPr>
+            <a:endParaRPr lang="de-DE" dirty="0"/>
+          </a:p>
+        </p:txBody>
+      </p:sp>
+      <p:sp>
+        <p:nvSpPr>
+          <p:cNvPr id="7" name="Foliennummernplatzhalter 6"/>
+          <p:cNvSpPr>
+            <a:spLocks noGrp="1"/>
+          </p:cNvSpPr>
+          <p:nvPr>
+            <p:ph type="sldNum" sz="quarter" idx="12"/>
+          </p:nvPr>
+        </p:nvSpPr>
+        <p:spPr/>
+        <p:txBody>
+          <a:bodyPr/>
+          <a:lstStyle/>
+          <a:p>
+            <a:fld id="{9CDE1BF7-98F8-4339-9767-51328A5E8D33}" type="slidenum">
+              <a:rPr lang="de-DE" smtClean="0"/>
+              <a:t>6</a:t>
+            </a:fld>
+            <a:endParaRPr lang="de-DE"/>
+          </a:p>
+        </p:txBody>
+      </p:sp>
+      <p:sp>
+        <p:nvSpPr>
+          <p:cNvPr id="8" name="Titel 4"/>
+          <p:cNvSpPr>
+            <a:spLocks noGrp="1"/>
+          </p:cNvSpPr>
+          <p:nvPr>
+            <p:ph type="title"/>
+          </p:nvPr>
+        </p:nvSpPr>
+        <p:spPr>
+          <a:xfrm>
+            <a:off x="551866" y="556782"/>
+            <a:ext cx="7886700" cy="1325563"/>
+          </a:xfrm>
+        </p:spPr>
+        <p:txBody>
+          <a:bodyPr>
+            <a:normAutofit/>
+          </a:bodyPr>
+          <a:lstStyle/>
+          <a:p>
+            <a:r>
+              <a:rPr lang="de-DE" sz="4000" dirty="0"/>
+              <a:t>Mock-</a:t>
+            </a:r>
+            <a:r>
+              <a:rPr lang="de-DE" sz="4000" dirty="0" err="1"/>
+              <a:t>Ups</a:t>
+            </a:r>
+            <a:endParaRPr lang="de-DE" sz="4000" dirty="0"/>
+          </a:p>
+        </p:txBody>
+      </p:sp>
       <p:sp>
         <p:nvSpPr>
           <p:cNvPr id="9" name="Inhaltsplatzhalter 5"/>
@@ -4617,53 +5077,8 @@
             </a:lvl9pPr>
           </a:lstStyle>
           <a:p>
-            <a:r>
-              <a:rPr lang="de-DE" sz="2400" dirty="0"/>
-              <a:t>Andreas Müller der preisbewusste Familienvater</a:t>
-            </a:r>
-          </a:p>
-          <a:p>
-            <a:pPr lvl="1"/>
-            <a:r>
-              <a:rPr lang="de-DE" sz="2000" dirty="0"/>
-              <a:t>Technisch kaum versiert</a:t>
-            </a:r>
-          </a:p>
-          <a:p>
-            <a:pPr lvl="1"/>
-            <a:r>
-              <a:rPr lang="de-DE" sz="2000" dirty="0"/>
-              <a:t>Wenig Onlineerfahrung</a:t>
-            </a:r>
-          </a:p>
-          <a:p>
-            <a:pPr lvl="1"/>
-            <a:r>
-              <a:rPr lang="de-DE" sz="2000" dirty="0"/>
-              <a:t>Beschäftigt sich kaum mit Shops</a:t>
-            </a:r>
-          </a:p>
-          <a:p>
-            <a:pPr lvl="1"/>
-            <a:r>
-              <a:rPr lang="de-DE" sz="2000" dirty="0"/>
-              <a:t>Auf neue Funktionen legt er keinen Wert </a:t>
-            </a:r>
-          </a:p>
-          <a:p>
-            <a:pPr lvl="1"/>
-            <a:r>
-              <a:rPr lang="de-DE" sz="2000" dirty="0"/>
-              <a:t>Typischer „DAU“</a:t>
-            </a:r>
-          </a:p>
-          <a:p>
-            <a:endParaRPr lang="de-DE" dirty="0"/>
-          </a:p>
-          <a:p>
-            <a:pPr marL="571500" indent="-571500">
-              <a:buFont typeface="+mj-lt"/>
-              <a:buAutoNum type="romanUcPeriod"/>
+            <a:pPr marL="0" indent="0">
+              <a:buNone/>
             </a:pPr>
             <a:endParaRPr lang="de-DE" dirty="0"/>
           </a:p>
@@ -4678,28 +5093,22 @@
       </p:sp>
       <p:pic>
         <p:nvPicPr>
-          <p:cNvPr id="10" name="Grafik 9"/>
+          <p:cNvPr id="11" name="Inhaltsplatzhalter 3"/>
           <p:cNvPicPr>
-            <a:picLocks noChangeAspect="1"/>
+            <a:picLocks noGrp="1" noChangeAspect="1"/>
           </p:cNvPicPr>
           <p:nvPr/>
         </p:nvPicPr>
         <p:blipFill>
-          <a:blip r:embed="rId3">
-            <a:extLst>
-              <a:ext uri="{28A0092B-C50C-407E-A947-70E740481C1C}">
-                <a14:useLocalDpi xmlns:a14="http://schemas.microsoft.com/office/drawing/2010/main" val="0"/>
-              </a:ext>
-            </a:extLst>
-          </a:blip>
+          <a:blip r:embed="rId2"/>
           <a:stretch>
             <a:fillRect/>
           </a:stretch>
         </p:blipFill>
         <p:spPr>
           <a:xfrm>
-            <a:off x="2192405" y="3664607"/>
-            <a:ext cx="3221414" cy="2608006"/>
+            <a:off x="1466310" y="1460315"/>
+            <a:ext cx="5985524" cy="4202083"/>
           </a:xfrm>
           <a:prstGeom prst="rect">
             <a:avLst/>
@@ -4709,149 +5118,20 @@
     </p:spTree>
     <p:extLst>
       <p:ext uri="{BB962C8B-B14F-4D97-AF65-F5344CB8AC3E}">
-        <p14:creationId xmlns:p14="http://schemas.microsoft.com/office/powerpoint/2010/main" val="295717713"/>
+        <p14:creationId xmlns:p14="http://schemas.microsoft.com/office/powerpoint/2010/main" val="1106669652"/>
       </p:ext>
     </p:extLst>
   </p:cSld>
   <p:clrMapOvr>
     <a:masterClrMapping/>
   </p:clrMapOvr>
-</p:sld>
-</file>
-
-<file path=ppt/slides/slide6.xml><?xml version="1.0" encoding="utf-8"?>
-<p:sld xmlns:a="http://schemas.openxmlformats.org/drawingml/2006/main" xmlns:r="http://schemas.openxmlformats.org/officeDocument/2006/relationships" xmlns:p="http://schemas.openxmlformats.org/presentationml/2006/main">
-  <p:cSld>
-    <p:spTree>
-      <p:nvGrpSpPr>
-        <p:cNvPr id="1" name=""/>
-        <p:cNvGrpSpPr/>
-        <p:nvPr/>
-      </p:nvGrpSpPr>
-      <p:grpSpPr>
-        <a:xfrm>
-          <a:off x="0" y="0"/>
-          <a:ext cx="0" cy="0"/>
-          <a:chOff x="0" y="0"/>
-          <a:chExt cx="0" cy="0"/>
-        </a:xfrm>
-      </p:grpSpPr>
-      <p:sp>
-        <p:nvSpPr>
-          <p:cNvPr id="6" name="Inhaltsplatzhalter 5"/>
-          <p:cNvSpPr>
-            <a:spLocks noGrp="1"/>
-          </p:cNvSpPr>
-          <p:nvPr>
-            <p:ph idx="1"/>
-          </p:nvPr>
-        </p:nvSpPr>
-        <p:spPr>
-          <a:xfrm>
-            <a:off x="492806" y="1890537"/>
-            <a:ext cx="8105151" cy="3617607"/>
-          </a:xfrm>
-        </p:spPr>
-        <p:txBody>
-          <a:bodyPr/>
-          <a:lstStyle/>
-          <a:p>
-            <a:pPr marL="0" indent="0">
-              <a:buNone/>
-            </a:pPr>
-            <a:r>
-              <a:rPr lang="de-DE" dirty="0"/>
-              <a:t>Andreas Müller </a:t>
-            </a:r>
-          </a:p>
-          <a:p>
-            <a:pPr marL="0" indent="0">
-              <a:buNone/>
-            </a:pPr>
-            <a:r>
-              <a:rPr lang="de-DE" dirty="0"/>
-              <a:t>[…]</a:t>
-            </a:r>
-          </a:p>
-          <a:p>
-            <a:pPr marL="0" indent="0">
-              <a:buNone/>
-            </a:pPr>
-            <a:r>
-              <a:rPr lang="de-DE" sz="2400" dirty="0"/>
-              <a:t>Zusammengefasst wünsche ich mir ein modernes Design, das auch technisch kaum versierten Benutzern wie mir eine problemlose Bedienung der Webseite ermöglicht. </a:t>
-            </a:r>
-          </a:p>
-          <a:p>
-            <a:pPr marL="0" indent="0">
-              <a:buNone/>
-            </a:pPr>
-            <a:endParaRPr lang="de-DE" dirty="0"/>
-          </a:p>
-        </p:txBody>
-      </p:sp>
-      <p:sp>
-        <p:nvSpPr>
-          <p:cNvPr id="7" name="Foliennummernplatzhalter 6"/>
-          <p:cNvSpPr>
-            <a:spLocks noGrp="1"/>
-          </p:cNvSpPr>
-          <p:nvPr>
-            <p:ph type="sldNum" sz="quarter" idx="12"/>
-          </p:nvPr>
-        </p:nvSpPr>
-        <p:spPr/>
-        <p:txBody>
-          <a:bodyPr/>
-          <a:lstStyle/>
-          <a:p>
-            <a:fld id="{9CDE1BF7-98F8-4339-9767-51328A5E8D33}" type="slidenum">
-              <a:rPr lang="de-DE" smtClean="0"/>
-              <a:t>6</a:t>
-            </a:fld>
-            <a:endParaRPr lang="de-DE"/>
-          </a:p>
-        </p:txBody>
-      </p:sp>
-      <p:sp>
-        <p:nvSpPr>
-          <p:cNvPr id="8" name="Titel 4"/>
-          <p:cNvSpPr>
-            <a:spLocks noGrp="1"/>
-          </p:cNvSpPr>
-          <p:nvPr>
-            <p:ph type="title"/>
-          </p:nvPr>
-        </p:nvSpPr>
-        <p:spPr>
-          <a:xfrm>
-            <a:off x="606581" y="694334"/>
-            <a:ext cx="7886700" cy="1325563"/>
-          </a:xfrm>
-        </p:spPr>
-        <p:txBody>
-          <a:bodyPr>
-            <a:normAutofit/>
-          </a:bodyPr>
-          <a:lstStyle/>
-          <a:p>
-            <a:r>
-              <a:rPr lang="de-DE" sz="4000" dirty="0"/>
-              <a:t>Userstory</a:t>
-            </a:r>
-          </a:p>
-        </p:txBody>
-      </p:sp>
-    </p:spTree>
-    <p:extLst>
-      <p:ext uri="{BB962C8B-B14F-4D97-AF65-F5344CB8AC3E}">
-        <p14:creationId xmlns:p14="http://schemas.microsoft.com/office/powerpoint/2010/main" val="3068418944"/>
-      </p:ext>
-    </p:extLst>
-  </p:cSld>
-  <p:clrMapOvr>
-    <a:masterClrMapping/>
-  </p:clrMapOvr>
+  <p:timing>
+    <p:tnLst>
+      <p:par>
+        <p:cTn id="1" dur="indefinite" restart="never" nodeType="tmRoot"/>
+      </p:par>
+    </p:tnLst>
+  </p:timing>
 </p:sld>
 </file>
 
@@ -4936,37 +5216,128 @@
           </a:p>
         </p:txBody>
       </p:sp>
-      <p:sp>
-        <p:nvSpPr>
-          <p:cNvPr id="8" name="Titel 4"/>
-          <p:cNvSpPr>
-            <a:spLocks noGrp="1"/>
-          </p:cNvSpPr>
-          <p:nvPr>
-            <p:ph type="title"/>
-          </p:nvPr>
-        </p:nvSpPr>
+      <p:pic>
+        <p:nvPicPr>
+          <p:cNvPr id="2" name="Grafik 1"/>
+          <p:cNvPicPr>
+            <a:picLocks noChangeAspect="1"/>
+          </p:cNvPicPr>
+          <p:nvPr/>
+        </p:nvPicPr>
+        <p:blipFill>
+          <a:blip r:embed="rId2"/>
+          <a:stretch>
+            <a:fillRect/>
+          </a:stretch>
+        </p:blipFill>
         <p:spPr>
           <a:xfrm>
-            <a:off x="551866" y="556782"/>
-            <a:ext cx="7886700" cy="1325563"/>
+            <a:off x="689608" y="838102"/>
+            <a:ext cx="7777014" cy="4975398"/>
+          </a:xfrm>
+          <a:prstGeom prst="rect">
+            <a:avLst/>
+          </a:prstGeom>
+        </p:spPr>
+      </p:pic>
+    </p:spTree>
+    <p:extLst>
+      <p:ext uri="{BB962C8B-B14F-4D97-AF65-F5344CB8AC3E}">
+        <p14:creationId xmlns:p14="http://schemas.microsoft.com/office/powerpoint/2010/main" val="2647365351"/>
+      </p:ext>
+    </p:extLst>
+  </p:cSld>
+  <p:clrMapOvr>
+    <a:masterClrMapping/>
+  </p:clrMapOvr>
+  <p:timing>
+    <p:tnLst>
+      <p:par>
+        <p:cTn id="1" dur="indefinite" restart="never" nodeType="tmRoot"/>
+      </p:par>
+    </p:tnLst>
+  </p:timing>
+</p:sld>
+</file>
+
+<file path=ppt/slides/slide8.xml><?xml version="1.0" encoding="utf-8"?>
+<p:sld xmlns:a="http://schemas.openxmlformats.org/drawingml/2006/main" xmlns:r="http://schemas.openxmlformats.org/officeDocument/2006/relationships" xmlns:p="http://schemas.openxmlformats.org/presentationml/2006/main">
+  <p:cSld>
+    <p:spTree>
+      <p:nvGrpSpPr>
+        <p:cNvPr id="1" name=""/>
+        <p:cNvGrpSpPr/>
+        <p:nvPr/>
+      </p:nvGrpSpPr>
+      <p:grpSpPr>
+        <a:xfrm>
+          <a:off x="0" y="0"/>
+          <a:ext cx="0" cy="0"/>
+          <a:chOff x="0" y="0"/>
+          <a:chExt cx="0" cy="0"/>
+        </a:xfrm>
+      </p:grpSpPr>
+      <p:sp>
+        <p:nvSpPr>
+          <p:cNvPr id="6" name="Inhaltsplatzhalter 5"/>
+          <p:cNvSpPr>
+            <a:spLocks noGrp="1"/>
+          </p:cNvSpPr>
+          <p:nvPr>
+            <p:ph idx="1"/>
+          </p:nvPr>
+        </p:nvSpPr>
+        <p:spPr>
+          <a:xfrm>
+            <a:off x="1091663" y="3561357"/>
+            <a:ext cx="8105151" cy="3617607"/>
           </a:xfrm>
         </p:spPr>
         <p:txBody>
-          <a:bodyPr>
-            <a:normAutofit/>
-          </a:bodyPr>
-          <a:lstStyle/>
-          <a:p>
-            <a:r>
-              <a:rPr lang="de-DE" sz="4000" dirty="0"/>
-              <a:t>Mock-</a:t>
-            </a:r>
-            <a:r>
-              <a:rPr lang="de-DE" sz="4000" dirty="0" err="1"/>
-              <a:t>Ups</a:t>
-            </a:r>
-            <a:endParaRPr lang="de-DE" sz="4000" dirty="0"/>
+          <a:bodyPr/>
+          <a:lstStyle/>
+          <a:p>
+            <a:endParaRPr lang="de-DE" sz="2400" dirty="0"/>
+          </a:p>
+          <a:p>
+            <a:endParaRPr lang="de-DE" dirty="0"/>
+          </a:p>
+          <a:p>
+            <a:pPr marL="571500" indent="-571500">
+              <a:buFont typeface="+mj-lt"/>
+              <a:buAutoNum type="romanUcPeriod"/>
+            </a:pPr>
+            <a:endParaRPr lang="de-DE" dirty="0"/>
+          </a:p>
+          <a:p>
+            <a:pPr marL="514350" indent="-514350">
+              <a:buFont typeface="+mj-lt"/>
+              <a:buAutoNum type="romanUcPeriod"/>
+            </a:pPr>
+            <a:endParaRPr lang="de-DE" dirty="0"/>
+          </a:p>
+        </p:txBody>
+      </p:sp>
+      <p:sp>
+        <p:nvSpPr>
+          <p:cNvPr id="7" name="Foliennummernplatzhalter 6"/>
+          <p:cNvSpPr>
+            <a:spLocks noGrp="1"/>
+          </p:cNvSpPr>
+          <p:nvPr>
+            <p:ph type="sldNum" sz="quarter" idx="12"/>
+          </p:nvPr>
+        </p:nvSpPr>
+        <p:spPr/>
+        <p:txBody>
+          <a:bodyPr/>
+          <a:lstStyle/>
+          <a:p>
+            <a:fld id="{9CDE1BF7-98F8-4339-9767-51328A5E8D33}" type="slidenum">
+              <a:rPr lang="de-DE" smtClean="0"/>
+              <a:t>8</a:t>
+            </a:fld>
+            <a:endParaRPr lang="de-DE"/>
           </a:p>
         </p:txBody>
       </p:sp>
@@ -5156,360 +5527,6 @@
             </a:lvl9pPr>
           </a:lstStyle>
           <a:p>
-            <a:r>
-              <a:rPr lang="de-DE" sz="2400" dirty="0"/>
-              <a:t>Entwurf der Anmeldemaske</a:t>
-            </a:r>
-          </a:p>
-          <a:p>
-            <a:pPr marL="571500" indent="-571500">
-              <a:buFont typeface="+mj-lt"/>
-              <a:buAutoNum type="romanUcPeriod"/>
-            </a:pPr>
-            <a:endParaRPr lang="de-DE" dirty="0"/>
-          </a:p>
-          <a:p>
-            <a:pPr marL="514350" indent="-514350">
-              <a:buFont typeface="+mj-lt"/>
-              <a:buAutoNum type="romanUcPeriod"/>
-            </a:pPr>
-            <a:endParaRPr lang="de-DE" dirty="0"/>
-          </a:p>
-        </p:txBody>
-      </p:sp>
-      <p:pic>
-        <p:nvPicPr>
-          <p:cNvPr id="11" name="Inhaltsplatzhalter 3"/>
-          <p:cNvPicPr>
-            <a:picLocks noGrp="1" noChangeAspect="1"/>
-          </p:cNvPicPr>
-          <p:nvPr/>
-        </p:nvPicPr>
-        <p:blipFill>
-          <a:blip r:embed="rId2"/>
-          <a:stretch>
-            <a:fillRect/>
-          </a:stretch>
-        </p:blipFill>
-        <p:spPr>
-          <a:xfrm>
-            <a:off x="289151" y="2276148"/>
-            <a:ext cx="3973307" cy="2789424"/>
-          </a:xfrm>
-          <a:prstGeom prst="rect">
-            <a:avLst/>
-          </a:prstGeom>
-        </p:spPr>
-      </p:pic>
-      <p:pic>
-        <p:nvPicPr>
-          <p:cNvPr id="12" name="Inhaltsplatzhalter 3"/>
-          <p:cNvPicPr>
-            <a:picLocks noGrp="1" noChangeAspect="1"/>
-          </p:cNvPicPr>
-          <p:nvPr/>
-        </p:nvPicPr>
-        <p:blipFill rotWithShape="1">
-          <a:blip r:embed="rId3">
-            <a:extLst>
-              <a:ext uri="{28A0092B-C50C-407E-A947-70E740481C1C}">
-                <a14:useLocalDpi xmlns:a14="http://schemas.microsoft.com/office/drawing/2010/main" val="0"/>
-              </a:ext>
-            </a:extLst>
-          </a:blip>
-          <a:srcRect l="7809" r="9836" b="11171"/>
-          <a:stretch/>
-        </p:blipFill>
-        <p:spPr>
-          <a:xfrm>
-            <a:off x="4477789" y="2304207"/>
-            <a:ext cx="4223491" cy="2733306"/>
-          </a:xfrm>
-          <a:prstGeom prst="rect">
-            <a:avLst/>
-          </a:prstGeom>
-        </p:spPr>
-      </p:pic>
-    </p:spTree>
-    <p:extLst>
-      <p:ext uri="{BB962C8B-B14F-4D97-AF65-F5344CB8AC3E}">
-        <p14:creationId xmlns:p14="http://schemas.microsoft.com/office/powerpoint/2010/main" val="1106669652"/>
-      </p:ext>
-    </p:extLst>
-  </p:cSld>
-  <p:clrMapOvr>
-    <a:masterClrMapping/>
-  </p:clrMapOvr>
-</p:sld>
-</file>
-
-<file path=ppt/slides/slide8.xml><?xml version="1.0" encoding="utf-8"?>
-<p:sld xmlns:a="http://schemas.openxmlformats.org/drawingml/2006/main" xmlns:r="http://schemas.openxmlformats.org/officeDocument/2006/relationships" xmlns:p="http://schemas.openxmlformats.org/presentationml/2006/main">
-  <p:cSld>
-    <p:spTree>
-      <p:nvGrpSpPr>
-        <p:cNvPr id="1" name=""/>
-        <p:cNvGrpSpPr/>
-        <p:nvPr/>
-      </p:nvGrpSpPr>
-      <p:grpSpPr>
-        <a:xfrm>
-          <a:off x="0" y="0"/>
-          <a:ext cx="0" cy="0"/>
-          <a:chOff x="0" y="0"/>
-          <a:chExt cx="0" cy="0"/>
-        </a:xfrm>
-      </p:grpSpPr>
-      <p:sp>
-        <p:nvSpPr>
-          <p:cNvPr id="6" name="Inhaltsplatzhalter 5"/>
-          <p:cNvSpPr>
-            <a:spLocks noGrp="1"/>
-          </p:cNvSpPr>
-          <p:nvPr>
-            <p:ph idx="1"/>
-          </p:nvPr>
-        </p:nvSpPr>
-        <p:spPr>
-          <a:xfrm>
-            <a:off x="1091663" y="3561357"/>
-            <a:ext cx="8105151" cy="3617607"/>
-          </a:xfrm>
-        </p:spPr>
-        <p:txBody>
-          <a:bodyPr/>
-          <a:lstStyle/>
-          <a:p>
-            <a:endParaRPr lang="de-DE" sz="2400" dirty="0"/>
-          </a:p>
-          <a:p>
-            <a:endParaRPr lang="de-DE" dirty="0"/>
-          </a:p>
-          <a:p>
-            <a:pPr marL="571500" indent="-571500">
-              <a:buFont typeface="+mj-lt"/>
-              <a:buAutoNum type="romanUcPeriod"/>
-            </a:pPr>
-            <a:endParaRPr lang="de-DE" dirty="0"/>
-          </a:p>
-          <a:p>
-            <a:pPr marL="514350" indent="-514350">
-              <a:buFont typeface="+mj-lt"/>
-              <a:buAutoNum type="romanUcPeriod"/>
-            </a:pPr>
-            <a:endParaRPr lang="de-DE" dirty="0"/>
-          </a:p>
-        </p:txBody>
-      </p:sp>
-      <p:sp>
-        <p:nvSpPr>
-          <p:cNvPr id="7" name="Foliennummernplatzhalter 6"/>
-          <p:cNvSpPr>
-            <a:spLocks noGrp="1"/>
-          </p:cNvSpPr>
-          <p:nvPr>
-            <p:ph type="sldNum" sz="quarter" idx="12"/>
-          </p:nvPr>
-        </p:nvSpPr>
-        <p:spPr/>
-        <p:txBody>
-          <a:bodyPr/>
-          <a:lstStyle/>
-          <a:p>
-            <a:fld id="{9CDE1BF7-98F8-4339-9767-51328A5E8D33}" type="slidenum">
-              <a:rPr lang="de-DE" smtClean="0"/>
-              <a:t>8</a:t>
-            </a:fld>
-            <a:endParaRPr lang="de-DE"/>
-          </a:p>
-        </p:txBody>
-      </p:sp>
-      <p:sp>
-        <p:nvSpPr>
-          <p:cNvPr id="9" name="Inhaltsplatzhalter 5"/>
-          <p:cNvSpPr txBox="1">
-            <a:spLocks/>
-          </p:cNvSpPr>
-          <p:nvPr/>
-        </p:nvSpPr>
-        <p:spPr>
-          <a:xfrm>
-            <a:off x="442640" y="1637910"/>
-            <a:ext cx="8105151" cy="3617607"/>
-          </a:xfrm>
-          <a:prstGeom prst="rect">
-            <a:avLst/>
-          </a:prstGeom>
-        </p:spPr>
-        <p:txBody>
-          <a:bodyPr vert="horz" lIns="91440" tIns="45720" rIns="91440" bIns="45720" rtlCol="0">
-            <a:normAutofit/>
-          </a:bodyPr>
-          <a:lstStyle>
-            <a:lvl1pPr marL="228600" indent="-228600" algn="l" defTabSz="914400" rtl="0" eaLnBrk="1" latinLnBrk="0" hangingPunct="1">
-              <a:lnSpc>
-                <a:spcPct val="90000"/>
-              </a:lnSpc>
-              <a:spcBef>
-                <a:spcPts val="1000"/>
-              </a:spcBef>
-              <a:buFont typeface="Arial" panose="020B0604020202020204" pitchFamily="34" charset="0"/>
-              <a:buChar char="•"/>
-              <a:defRPr sz="2800" kern="1200">
-                <a:solidFill>
-                  <a:schemeClr val="tx1"/>
-                </a:solidFill>
-                <a:latin typeface="+mn-lt"/>
-                <a:ea typeface="+mn-ea"/>
-                <a:cs typeface="+mn-cs"/>
-              </a:defRPr>
-            </a:lvl1pPr>
-            <a:lvl2pPr marL="685800" indent="-228600" algn="l" defTabSz="914400" rtl="0" eaLnBrk="1" latinLnBrk="0" hangingPunct="1">
-              <a:lnSpc>
-                <a:spcPct val="90000"/>
-              </a:lnSpc>
-              <a:spcBef>
-                <a:spcPts val="500"/>
-              </a:spcBef>
-              <a:buFont typeface="Arial" panose="020B0604020202020204" pitchFamily="34" charset="0"/>
-              <a:buChar char="•"/>
-              <a:defRPr sz="2400" kern="1200">
-                <a:solidFill>
-                  <a:schemeClr val="tx1"/>
-                </a:solidFill>
-                <a:latin typeface="+mn-lt"/>
-                <a:ea typeface="+mn-ea"/>
-                <a:cs typeface="+mn-cs"/>
-              </a:defRPr>
-            </a:lvl2pPr>
-            <a:lvl3pPr marL="1143000" indent="-228600" algn="l" defTabSz="914400" rtl="0" eaLnBrk="1" latinLnBrk="0" hangingPunct="1">
-              <a:lnSpc>
-                <a:spcPct val="90000"/>
-              </a:lnSpc>
-              <a:spcBef>
-                <a:spcPts val="500"/>
-              </a:spcBef>
-              <a:buFont typeface="Arial" panose="020B0604020202020204" pitchFamily="34" charset="0"/>
-              <a:buChar char="•"/>
-              <a:defRPr sz="2000" kern="1200">
-                <a:solidFill>
-                  <a:schemeClr val="tx1"/>
-                </a:solidFill>
-                <a:latin typeface="+mn-lt"/>
-                <a:ea typeface="+mn-ea"/>
-                <a:cs typeface="+mn-cs"/>
-              </a:defRPr>
-            </a:lvl3pPr>
-            <a:lvl4pPr marL="1600200" indent="-228600" algn="l" defTabSz="914400" rtl="0" eaLnBrk="1" latinLnBrk="0" hangingPunct="1">
-              <a:lnSpc>
-                <a:spcPct val="90000"/>
-              </a:lnSpc>
-              <a:spcBef>
-                <a:spcPts val="500"/>
-              </a:spcBef>
-              <a:buFont typeface="Arial" panose="020B0604020202020204" pitchFamily="34" charset="0"/>
-              <a:buChar char="•"/>
-              <a:defRPr sz="1800" kern="1200">
-                <a:solidFill>
-                  <a:schemeClr val="tx1"/>
-                </a:solidFill>
-                <a:latin typeface="+mn-lt"/>
-                <a:ea typeface="+mn-ea"/>
-                <a:cs typeface="+mn-cs"/>
-              </a:defRPr>
-            </a:lvl4pPr>
-            <a:lvl5pPr marL="2057400" indent="-228600" algn="l" defTabSz="914400" rtl="0" eaLnBrk="1" latinLnBrk="0" hangingPunct="1">
-              <a:lnSpc>
-                <a:spcPct val="90000"/>
-              </a:lnSpc>
-              <a:spcBef>
-                <a:spcPts val="500"/>
-              </a:spcBef>
-              <a:buFont typeface="Arial" panose="020B0604020202020204" pitchFamily="34" charset="0"/>
-              <a:buChar char="•"/>
-              <a:defRPr sz="1800" kern="1200">
-                <a:solidFill>
-                  <a:schemeClr val="tx1"/>
-                </a:solidFill>
-                <a:latin typeface="+mn-lt"/>
-                <a:ea typeface="+mn-ea"/>
-                <a:cs typeface="+mn-cs"/>
-              </a:defRPr>
-            </a:lvl5pPr>
-            <a:lvl6pPr marL="2514600" indent="-228600" algn="l" defTabSz="914400" rtl="0" eaLnBrk="1" latinLnBrk="0" hangingPunct="1">
-              <a:lnSpc>
-                <a:spcPct val="90000"/>
-              </a:lnSpc>
-              <a:spcBef>
-                <a:spcPts val="500"/>
-              </a:spcBef>
-              <a:buFont typeface="Arial" panose="020B0604020202020204" pitchFamily="34" charset="0"/>
-              <a:buChar char="•"/>
-              <a:defRPr sz="1800" kern="1200">
-                <a:solidFill>
-                  <a:schemeClr val="tx1"/>
-                </a:solidFill>
-                <a:latin typeface="+mn-lt"/>
-                <a:ea typeface="+mn-ea"/>
-                <a:cs typeface="+mn-cs"/>
-              </a:defRPr>
-            </a:lvl6pPr>
-            <a:lvl7pPr marL="2971800" indent="-228600" algn="l" defTabSz="914400" rtl="0" eaLnBrk="1" latinLnBrk="0" hangingPunct="1">
-              <a:lnSpc>
-                <a:spcPct val="90000"/>
-              </a:lnSpc>
-              <a:spcBef>
-                <a:spcPts val="500"/>
-              </a:spcBef>
-              <a:buFont typeface="Arial" panose="020B0604020202020204" pitchFamily="34" charset="0"/>
-              <a:buChar char="•"/>
-              <a:defRPr sz="1800" kern="1200">
-                <a:solidFill>
-                  <a:schemeClr val="tx1"/>
-                </a:solidFill>
-                <a:latin typeface="+mn-lt"/>
-                <a:ea typeface="+mn-ea"/>
-                <a:cs typeface="+mn-cs"/>
-              </a:defRPr>
-            </a:lvl7pPr>
-            <a:lvl8pPr marL="3429000" indent="-228600" algn="l" defTabSz="914400" rtl="0" eaLnBrk="1" latinLnBrk="0" hangingPunct="1">
-              <a:lnSpc>
-                <a:spcPct val="90000"/>
-              </a:lnSpc>
-              <a:spcBef>
-                <a:spcPts val="500"/>
-              </a:spcBef>
-              <a:buFont typeface="Arial" panose="020B0604020202020204" pitchFamily="34" charset="0"/>
-              <a:buChar char="•"/>
-              <a:defRPr sz="1800" kern="1200">
-                <a:solidFill>
-                  <a:schemeClr val="tx1"/>
-                </a:solidFill>
-                <a:latin typeface="+mn-lt"/>
-                <a:ea typeface="+mn-ea"/>
-                <a:cs typeface="+mn-cs"/>
-              </a:defRPr>
-            </a:lvl8pPr>
-            <a:lvl9pPr marL="3886200" indent="-228600" algn="l" defTabSz="914400" rtl="0" eaLnBrk="1" latinLnBrk="0" hangingPunct="1">
-              <a:lnSpc>
-                <a:spcPct val="90000"/>
-              </a:lnSpc>
-              <a:spcBef>
-                <a:spcPts val="500"/>
-              </a:spcBef>
-              <a:buFont typeface="Arial" panose="020B0604020202020204" pitchFamily="34" charset="0"/>
-              <a:buChar char="•"/>
-              <a:defRPr sz="1800" kern="1200">
-                <a:solidFill>
-                  <a:schemeClr val="tx1"/>
-                </a:solidFill>
-                <a:latin typeface="+mn-lt"/>
-                <a:ea typeface="+mn-ea"/>
-                <a:cs typeface="+mn-cs"/>
-              </a:defRPr>
-            </a:lvl9pPr>
-          </a:lstStyle>
-          <a:p>
             <a:pPr marL="0" indent="0">
               <a:buNone/>
             </a:pPr>
@@ -5564,6 +5581,13 @@
   <p:clrMapOvr>
     <a:masterClrMapping/>
   </p:clrMapOvr>
+  <p:timing>
+    <p:tnLst>
+      <p:par>
+        <p:cTn id="1" dur="indefinite" restart="never" nodeType="tmRoot"/>
+      </p:par>
+    </p:tnLst>
+  </p:timing>
 </p:sld>
 </file>
 
@@ -5687,6 +5711,13 @@
   <p:clrMapOvr>
     <a:masterClrMapping/>
   </p:clrMapOvr>
+  <p:timing>
+    <p:tnLst>
+      <p:par>
+        <p:cTn id="1" dur="indefinite" restart="never" nodeType="tmRoot"/>
+      </p:par>
+    </p:tnLst>
+  </p:timing>
 </p:sld>
 </file>
 

</xml_diff>